<commit_message>
added search button and image to astronaut search
</commit_message>
<xml_diff>
--- a/Space Explorer Group Presentation.pptx
+++ b/Space Explorer Group Presentation.pptx
@@ -113,6 +113,11 @@
       </a:defRPr>
     </a:lvl9pPr>
   </p:defaultTextStyle>
+  <p:extLst>
+    <p:ext uri="{EFAFB233-063F-42B5-8137-9DF3F51BA10A}">
+      <p15:sldGuideLst xmlns:p15="http://schemas.microsoft.com/office/powerpoint/2012/main"/>
+    </p:ext>
+  </p:extLst>
 </p:presentation>
 </file>
 
@@ -1181,8 +1186,8 @@
         </p:blipFill>
         <p:spPr>
           <a:xfrm>
-            <a:off x="4913424" y="2374458"/>
-            <a:ext cx="3018644" cy="4024859"/>
+            <a:off x="4949577" y="2145074"/>
+            <a:ext cx="1869085" cy="2492113"/>
           </a:xfrm>
           <a:prstGeom prst="rect">
             <a:avLst/>
@@ -1217,8 +1222,8 @@
         </p:blipFill>
         <p:spPr>
           <a:xfrm>
-            <a:off x="1047975" y="2145074"/>
-            <a:ext cx="4449720" cy="2560355"/>
+            <a:off x="1404079" y="2145074"/>
+            <a:ext cx="3423078" cy="2100889"/>
           </a:xfrm>
           <a:prstGeom prst="rect">
             <a:avLst/>
@@ -1253,8 +1258,232 @@
         </p:blipFill>
         <p:spPr>
           <a:xfrm>
-            <a:off x="7420939" y="2145074"/>
-            <a:ext cx="3969259" cy="2637079"/>
+            <a:off x="6941082" y="2115808"/>
+            <a:ext cx="3724419" cy="2100889"/>
+          </a:xfrm>
+          <a:prstGeom prst="rect">
+            <a:avLst/>
+          </a:prstGeom>
+        </p:spPr>
+      </p:pic>
+      <p:sp>
+        <p:nvSpPr>
+          <p:cNvPr id="4" name="TextBox 3">
+            <a:extLst>
+              <a:ext uri="{FF2B5EF4-FFF2-40B4-BE49-F238E27FC236}">
+                <a16:creationId xmlns:a16="http://schemas.microsoft.com/office/drawing/2014/main" id="{AD66D140-F701-452B-9B58-59CE9D4D333C}"/>
+              </a:ext>
+            </a:extLst>
+          </p:cNvPr>
+          <p:cNvSpPr txBox="1"/>
+          <p:nvPr/>
+        </p:nvSpPr>
+        <p:spPr>
+          <a:xfrm>
+            <a:off x="457680" y="4742192"/>
+            <a:ext cx="10852878" cy="1446550"/>
+          </a:xfrm>
+          <a:prstGeom prst="rect">
+            <a:avLst/>
+          </a:prstGeom>
+          <a:noFill/>
+        </p:spPr>
+        <p:txBody>
+          <a:bodyPr wrap="square" rtlCol="0">
+            <a:spAutoFit/>
+          </a:bodyPr>
+          <a:lstStyle/>
+          <a:p>
+            <a:pPr algn="ctr"/>
+            <a:r>
+              <a:rPr lang="en-US" sz="3200" dirty="0"/>
+              <a:t>Brought to you by:</a:t>
+            </a:r>
+          </a:p>
+          <a:p>
+            <a:pPr algn="ctr"/>
+            <a:endParaRPr lang="en-US" sz="2800" dirty="0"/>
+          </a:p>
+          <a:p>
+            <a:pPr algn="ctr"/>
+            <a:endParaRPr lang="en-US" sz="2800" dirty="0"/>
+          </a:p>
+        </p:txBody>
+      </p:sp>
+      <p:pic>
+        <p:nvPicPr>
+          <p:cNvPr id="8" name="Picture 7" descr="A person taking a selfie&#10;&#10;Description automatically generated with medium confidence">
+            <a:extLst>
+              <a:ext uri="{FF2B5EF4-FFF2-40B4-BE49-F238E27FC236}">
+                <a16:creationId xmlns:a16="http://schemas.microsoft.com/office/drawing/2014/main" id="{9D6ACB1E-0B0E-4E02-A77C-D215029B32FD}"/>
+              </a:ext>
+            </a:extLst>
+          </p:cNvPr>
+          <p:cNvPicPr>
+            <a:picLocks noChangeAspect="1"/>
+          </p:cNvPicPr>
+          <p:nvPr/>
+        </p:nvPicPr>
+        <p:blipFill>
+          <a:blip r:embed="rId6">
+            <a:extLst>
+              <a:ext uri="{28A0092B-C50C-407E-A947-70E740481C1C}">
+                <a14:useLocalDpi xmlns:a14="http://schemas.microsoft.com/office/drawing/2010/main" val="0"/>
+              </a:ext>
+            </a:extLst>
+          </a:blip>
+          <a:stretch>
+            <a:fillRect/>
+          </a:stretch>
+        </p:blipFill>
+        <p:spPr>
+          <a:xfrm>
+            <a:off x="2088877" y="5394977"/>
+            <a:ext cx="952381" cy="952381"/>
+          </a:xfrm>
+          <a:prstGeom prst="rect">
+            <a:avLst/>
+          </a:prstGeom>
+        </p:spPr>
+      </p:pic>
+      <p:pic>
+        <p:nvPicPr>
+          <p:cNvPr id="12" name="Picture 11" descr="A person wearing glasses&#10;&#10;Description automatically generated with medium confidence">
+            <a:extLst>
+              <a:ext uri="{FF2B5EF4-FFF2-40B4-BE49-F238E27FC236}">
+                <a16:creationId xmlns:a16="http://schemas.microsoft.com/office/drawing/2014/main" id="{C8AF01F1-B2C5-45AC-93EB-F006BFB34CDE}"/>
+              </a:ext>
+            </a:extLst>
+          </p:cNvPr>
+          <p:cNvPicPr>
+            <a:picLocks noChangeAspect="1"/>
+          </p:cNvPicPr>
+          <p:nvPr/>
+        </p:nvPicPr>
+        <p:blipFill>
+          <a:blip r:embed="rId7">
+            <a:extLst>
+              <a:ext uri="{28A0092B-C50C-407E-A947-70E740481C1C}">
+                <a14:useLocalDpi xmlns:a14="http://schemas.microsoft.com/office/drawing/2010/main" val="0"/>
+              </a:ext>
+            </a:extLst>
+          </a:blip>
+          <a:stretch>
+            <a:fillRect/>
+          </a:stretch>
+        </p:blipFill>
+        <p:spPr>
+          <a:xfrm>
+            <a:off x="3814489" y="5384560"/>
+            <a:ext cx="952381" cy="952381"/>
+          </a:xfrm>
+          <a:prstGeom prst="rect">
+            <a:avLst/>
+          </a:prstGeom>
+        </p:spPr>
+      </p:pic>
+      <p:pic>
+        <p:nvPicPr>
+          <p:cNvPr id="14" name="Picture 13" descr="A picture containing person, window, indoor, person&#10;&#10;Description automatically generated">
+            <a:extLst>
+              <a:ext uri="{FF2B5EF4-FFF2-40B4-BE49-F238E27FC236}">
+                <a16:creationId xmlns:a16="http://schemas.microsoft.com/office/drawing/2014/main" id="{686562DF-F137-4548-845E-93BF04658EA8}"/>
+              </a:ext>
+            </a:extLst>
+          </p:cNvPr>
+          <p:cNvPicPr>
+            <a:picLocks noChangeAspect="1"/>
+          </p:cNvPicPr>
+          <p:nvPr/>
+        </p:nvPicPr>
+        <p:blipFill>
+          <a:blip r:embed="rId8">
+            <a:extLst>
+              <a:ext uri="{28A0092B-C50C-407E-A947-70E740481C1C}">
+                <a14:useLocalDpi xmlns:a14="http://schemas.microsoft.com/office/drawing/2010/main" val="0"/>
+              </a:ext>
+            </a:extLst>
+          </a:blip>
+          <a:stretch>
+            <a:fillRect/>
+          </a:stretch>
+        </p:blipFill>
+        <p:spPr>
+          <a:xfrm>
+            <a:off x="5540101" y="5384560"/>
+            <a:ext cx="952381" cy="952381"/>
+          </a:xfrm>
+          <a:prstGeom prst="rect">
+            <a:avLst/>
+          </a:prstGeom>
+        </p:spPr>
+      </p:pic>
+      <p:pic>
+        <p:nvPicPr>
+          <p:cNvPr id="16" name="Picture 15" descr="A person wearing a mask&#10;&#10;Description automatically generated with low confidence">
+            <a:extLst>
+              <a:ext uri="{FF2B5EF4-FFF2-40B4-BE49-F238E27FC236}">
+                <a16:creationId xmlns:a16="http://schemas.microsoft.com/office/drawing/2014/main" id="{596817F2-3835-49F1-874C-EC0AC6FD5DDA}"/>
+              </a:ext>
+            </a:extLst>
+          </p:cNvPr>
+          <p:cNvPicPr>
+            <a:picLocks noChangeAspect="1"/>
+          </p:cNvPicPr>
+          <p:nvPr/>
+        </p:nvPicPr>
+        <p:blipFill>
+          <a:blip r:embed="rId9">
+            <a:extLst>
+              <a:ext uri="{28A0092B-C50C-407E-A947-70E740481C1C}">
+                <a14:useLocalDpi xmlns:a14="http://schemas.microsoft.com/office/drawing/2010/main" val="0"/>
+              </a:ext>
+            </a:extLst>
+          </a:blip>
+          <a:stretch>
+            <a:fillRect/>
+          </a:stretch>
+        </p:blipFill>
+        <p:spPr>
+          <a:xfrm>
+            <a:off x="7265713" y="5384886"/>
+            <a:ext cx="952381" cy="952381"/>
+          </a:xfrm>
+          <a:prstGeom prst="rect">
+            <a:avLst/>
+          </a:prstGeom>
+        </p:spPr>
+      </p:pic>
+      <p:pic>
+        <p:nvPicPr>
+          <p:cNvPr id="18" name="Picture 17" descr="A person taking a selfie&#10;&#10;Description automatically generated">
+            <a:extLst>
+              <a:ext uri="{FF2B5EF4-FFF2-40B4-BE49-F238E27FC236}">
+                <a16:creationId xmlns:a16="http://schemas.microsoft.com/office/drawing/2014/main" id="{A40CFEC3-4532-482F-B619-4AB0E096E797}"/>
+              </a:ext>
+            </a:extLst>
+          </p:cNvPr>
+          <p:cNvPicPr>
+            <a:picLocks noChangeAspect="1"/>
+          </p:cNvPicPr>
+          <p:nvPr/>
+        </p:nvPicPr>
+        <p:blipFill>
+          <a:blip r:embed="rId10">
+            <a:extLst>
+              <a:ext uri="{28A0092B-C50C-407E-A947-70E740481C1C}">
+                <a14:useLocalDpi xmlns:a14="http://schemas.microsoft.com/office/drawing/2010/main" val="0"/>
+              </a:ext>
+            </a:extLst>
+          </a:blip>
+          <a:stretch>
+            <a:fillRect/>
+          </a:stretch>
+        </p:blipFill>
+        <p:spPr>
+          <a:xfrm>
+            <a:off x="8991325" y="5375835"/>
+            <a:ext cx="952381" cy="952381"/>
           </a:xfrm>
           <a:prstGeom prst="rect">
             <a:avLst/>

</xml_diff>

<commit_message>
updated powerpoint and readme with new name
</commit_message>
<xml_diff>
--- a/Space Explorer Group Presentation.pptx
+++ b/Space Explorer Group Presentation.pptx
@@ -5,16 +5,17 @@
     <p:sldMasterId id="2147483648" r:id="rId1"/>
   </p:sldMasterIdLst>
   <p:notesMasterIdLst>
-    <p:notesMasterId r:id="rId9"/>
+    <p:notesMasterId r:id="rId10"/>
   </p:notesMasterIdLst>
   <p:sldIdLst>
     <p:sldId id="256" r:id="rId2"/>
     <p:sldId id="257" r:id="rId3"/>
-    <p:sldId id="259" r:id="rId4"/>
-    <p:sldId id="263" r:id="rId5"/>
+    <p:sldId id="263" r:id="rId4"/>
+    <p:sldId id="259" r:id="rId5"/>
     <p:sldId id="260" r:id="rId6"/>
     <p:sldId id="261" r:id="rId7"/>
     <p:sldId id="262" r:id="rId8"/>
+    <p:sldId id="264" r:id="rId9"/>
   </p:sldIdLst>
   <p:sldSz cx="12192000" cy="6858000"/>
   <p:notesSz cx="6858000" cy="9144000"/>
@@ -1673,7 +1674,7 @@
           <p:cNvPr id="2" name="Title 1">
             <a:extLst>
               <a:ext uri="{FF2B5EF4-FFF2-40B4-BE49-F238E27FC236}">
-                <a16:creationId xmlns:a16="http://schemas.microsoft.com/office/drawing/2014/main" id="{04479D00-5071-4591-A604-7E4800E70563}"/>
+                <a16:creationId xmlns:a16="http://schemas.microsoft.com/office/drawing/2014/main" id="{212C812F-327A-4C13-823A-AA4C76980F67}"/>
               </a:ext>
             </a:extLst>
           </p:cNvPr>
@@ -1686,25 +1687,18 @@
         </p:nvSpPr>
         <p:spPr>
           <a:xfrm>
-            <a:off x="1524000" y="554635"/>
-            <a:ext cx="9144000" cy="820711"/>
+            <a:off x="1524000" y="511927"/>
+            <a:ext cx="9144000" cy="1111537"/>
           </a:xfrm>
         </p:spPr>
         <p:txBody>
           <a:bodyPr/>
           <a:lstStyle/>
           <a:p>
-            <a:pPr algn="l"/>
-            <a:r>
-              <a:rPr lang="en-US" sz="4800" dirty="0">
-                <a:solidFill>
-                  <a:srgbClr val="000000"/>
-                </a:solidFill>
-                <a:latin typeface="Arial" panose="020B0604020202020204" pitchFamily="34" charset="0"/>
-              </a:rPr>
-              <a:t>To create this project:</a:t>
-            </a:r>
-            <a:endParaRPr lang="en-US" sz="4800" dirty="0"/>
+            <a:r>
+              <a:rPr lang="en-US" b="1" dirty="0"/>
+              <a:t>CALLING ALL SPACE LOVERS!</a:t>
+            </a:r>
           </a:p>
         </p:txBody>
       </p:sp>
@@ -1713,7 +1707,7 @@
           <p:cNvPr id="3" name="Subtitle 2">
             <a:extLst>
               <a:ext uri="{FF2B5EF4-FFF2-40B4-BE49-F238E27FC236}">
-                <a16:creationId xmlns:a16="http://schemas.microsoft.com/office/drawing/2014/main" id="{60CE013E-6F9D-4A4D-922C-3E36C8158EE0}"/>
+                <a16:creationId xmlns:a16="http://schemas.microsoft.com/office/drawing/2014/main" id="{A0967115-2830-4EE7-9AAD-05DA9871BE3D}"/>
               </a:ext>
             </a:extLst>
           </p:cNvPr>
@@ -1726,91 +1720,177 @@
         </p:nvSpPr>
         <p:spPr>
           <a:xfrm>
-            <a:off x="1524000" y="1615189"/>
-            <a:ext cx="9144000" cy="4446245"/>
+            <a:off x="895546" y="1623464"/>
+            <a:ext cx="10435473" cy="4589961"/>
           </a:xfrm>
         </p:spPr>
         <p:txBody>
           <a:bodyPr/>
           <a:lstStyle/>
           <a:p>
-            <a:pPr marL="342900" indent="-342900" algn="l">
-              <a:buFont typeface="Arial" panose="020B0604020202020204" pitchFamily="34" charset="0"/>
-              <a:buChar char="•"/>
+            <a:pPr rtl="0" fontAlgn="base">
+              <a:spcBef>
+                <a:spcPts val="0"/>
+              </a:spcBef>
+              <a:spcAft>
+                <a:spcPts val="0"/>
+              </a:spcAft>
             </a:pPr>
             <a:r>
-              <a:rPr lang="en-US" sz="2000" dirty="0"/>
-              <a:t>HTML, CSS, </a:t>
-            </a:r>
-            <a:r>
-              <a:rPr lang="en-US" sz="2000" dirty="0" err="1"/>
-              <a:t>Bulma</a:t>
-            </a:r>
-            <a:r>
-              <a:rPr lang="en-US" sz="2000" dirty="0"/>
-              <a:t>, and JavaScript were used, as well as the </a:t>
-            </a:r>
-            <a:r>
-              <a:rPr lang="en-US" sz="2000" dirty="0" err="1"/>
-              <a:t>The</a:t>
-            </a:r>
-            <a:r>
-              <a:rPr lang="en-US" sz="2000" dirty="0"/>
-              <a:t> Space Devs API and Nasa’s Astronomy Picture of the Day API.</a:t>
-            </a:r>
-          </a:p>
-          <a:p>
-            <a:pPr marL="342900" indent="-342900" algn="l">
-              <a:buFont typeface="Arial" panose="020B0604020202020204" pitchFamily="34" charset="0"/>
-              <a:buChar char="•"/>
+              <a:rPr lang="en-US" sz="2800" dirty="0">
+                <a:solidFill>
+                  <a:srgbClr val="595959"/>
+                </a:solidFill>
+                <a:latin typeface="Arial" panose="020B0604020202020204" pitchFamily="34" charset="0"/>
+              </a:rPr>
+              <a:t>Space Explorer was created for YOU!</a:t>
+            </a:r>
+          </a:p>
+          <a:p>
+            <a:pPr rtl="0" fontAlgn="base">
+              <a:spcBef>
+                <a:spcPts val="0"/>
+              </a:spcBef>
+              <a:spcAft>
+                <a:spcPts val="0"/>
+              </a:spcAft>
             </a:pPr>
-            <a:r>
-              <a:rPr lang="en-US" sz="2000" dirty="0"/>
-              <a:t>We met several times to discuss our ideas and find APIs that would work for us. Once we finalized our idea and found the APIs, we started to break down tasks and roles. Jamie created the repository, researched the </a:t>
-            </a:r>
-            <a:r>
-              <a:rPr lang="en-US" sz="2000" dirty="0" err="1"/>
-              <a:t>Bulma</a:t>
-            </a:r>
-            <a:r>
-              <a:rPr lang="en-US" sz="2000" dirty="0"/>
-              <a:t> framework, and started on the HTML and CSS using </a:t>
-            </a:r>
-            <a:r>
-              <a:rPr lang="en-US" sz="2000" dirty="0" err="1"/>
-              <a:t>Bulma</a:t>
-            </a:r>
-            <a:r>
-              <a:rPr lang="en-US" sz="2000" dirty="0"/>
-              <a:t>, Christian found the APIs and fetched them, Brittney, Vanessa, and Christian worked on the JavaScript file to make it functional, and Tyler ___________.</a:t>
-            </a:r>
-          </a:p>
-          <a:p>
-            <a:pPr marL="342900" indent="-342900" algn="l">
-              <a:buFont typeface="Arial" panose="020B0604020202020204" pitchFamily="34" charset="0"/>
-              <a:buChar char="•"/>
+            <a:endParaRPr lang="en-US" sz="2800" dirty="0">
+              <a:solidFill>
+                <a:srgbClr val="595959"/>
+              </a:solidFill>
+              <a:latin typeface="Arial" panose="020B0604020202020204" pitchFamily="34" charset="0"/>
+            </a:endParaRPr>
+          </a:p>
+          <a:p>
+            <a:pPr rtl="0" fontAlgn="base">
+              <a:spcBef>
+                <a:spcPts val="0"/>
+              </a:spcBef>
+              <a:spcAft>
+                <a:spcPts val="0"/>
+              </a:spcAft>
             </a:pPr>
             <a:r>
-              <a:rPr lang="en-US" sz="2000" dirty="0"/>
-              <a:t>We encountered challenges right away. We had 2 other ideas and started on everything but found out the APIs wouldn’t work for us and had to change our idea TWICE!</a:t>
-            </a:r>
-          </a:p>
-          <a:p>
-            <a:pPr marL="342900" indent="-342900" algn="l">
-              <a:buFont typeface="Arial" panose="020B0604020202020204" pitchFamily="34" charset="0"/>
-              <a:buChar char="•"/>
+              <a:rPr lang="en-US" sz="2800" dirty="0">
+                <a:solidFill>
+                  <a:srgbClr val="595959"/>
+                </a:solidFill>
+                <a:latin typeface="Arial" panose="020B0604020202020204" pitchFamily="34" charset="0"/>
+              </a:rPr>
+              <a:t>We are so fortunate to live near NASA and are big fans of the space program. We are proud to share this with you!</a:t>
+            </a:r>
+          </a:p>
+          <a:p>
+            <a:pPr rtl="0" fontAlgn="base">
+              <a:spcBef>
+                <a:spcPts val="0"/>
+              </a:spcBef>
+              <a:spcAft>
+                <a:spcPts val="0"/>
+              </a:spcAft>
             </a:pPr>
-            <a:r>
-              <a:rPr lang="en-US" sz="2000" dirty="0"/>
-              <a:t>We also had successes throughout. We had good communication skills and reported our progress daily to ensure we met our deadlines and that our project was a success!</a:t>
-            </a:r>
+            <a:endParaRPr lang="en-US" sz="2800" b="0" i="0" u="none" strike="noStrike" dirty="0">
+              <a:solidFill>
+                <a:srgbClr val="595959"/>
+              </a:solidFill>
+              <a:effectLst/>
+              <a:latin typeface="Arial" panose="020B0604020202020204" pitchFamily="34" charset="0"/>
+            </a:endParaRPr>
+          </a:p>
+          <a:p>
+            <a:pPr rtl="0" fontAlgn="base">
+              <a:spcBef>
+                <a:spcPts val="0"/>
+              </a:spcBef>
+              <a:spcAft>
+                <a:spcPts val="1600"/>
+              </a:spcAft>
+            </a:pPr>
+            <a:r>
+              <a:rPr lang="en-US" sz="2800" b="1" dirty="0">
+                <a:solidFill>
+                  <a:srgbClr val="595959"/>
+                </a:solidFill>
+                <a:latin typeface="Arial" panose="020B0604020202020204" pitchFamily="34" charset="0"/>
+              </a:rPr>
+              <a:t>AS A</a:t>
+            </a:r>
+            <a:r>
+              <a:rPr lang="en-US" sz="2800" b="1" i="0" u="none" strike="noStrike" dirty="0">
+                <a:solidFill>
+                  <a:srgbClr val="595959"/>
+                </a:solidFill>
+                <a:effectLst/>
+                <a:latin typeface="Arial" panose="020B0604020202020204" pitchFamily="34" charset="0"/>
+              </a:rPr>
+              <a:t> person who loves space, </a:t>
+            </a:r>
+          </a:p>
+          <a:p>
+            <a:pPr rtl="0" fontAlgn="base">
+              <a:spcBef>
+                <a:spcPts val="0"/>
+              </a:spcBef>
+              <a:spcAft>
+                <a:spcPts val="1600"/>
+              </a:spcAft>
+            </a:pPr>
+            <a:r>
+              <a:rPr lang="en-US" sz="2800" b="1" i="0" u="none" strike="noStrike" dirty="0">
+                <a:solidFill>
+                  <a:srgbClr val="595959"/>
+                </a:solidFill>
+                <a:effectLst/>
+                <a:latin typeface="Arial" panose="020B0604020202020204" pitchFamily="34" charset="0"/>
+              </a:rPr>
+              <a:t>I WANT to learn more about historical launches, my favorite astronaut, and </a:t>
+            </a:r>
+            <a:r>
+              <a:rPr lang="en-US" sz="2800" b="1" dirty="0">
+                <a:solidFill>
+                  <a:srgbClr val="595959"/>
+                </a:solidFill>
+                <a:latin typeface="Arial" panose="020B0604020202020204" pitchFamily="34" charset="0"/>
+              </a:rPr>
+              <a:t>view NASA’s astronomy image of the day, </a:t>
+            </a:r>
+          </a:p>
+          <a:p>
+            <a:pPr rtl="0" fontAlgn="base">
+              <a:spcBef>
+                <a:spcPts val="0"/>
+              </a:spcBef>
+              <a:spcAft>
+                <a:spcPts val="1600"/>
+              </a:spcAft>
+            </a:pPr>
+            <a:r>
+              <a:rPr lang="en-US" sz="2800" b="1" dirty="0">
+                <a:solidFill>
+                  <a:srgbClr val="595959"/>
+                </a:solidFill>
+                <a:latin typeface="Arial" panose="020B0604020202020204" pitchFamily="34" charset="0"/>
+              </a:rPr>
+              <a:t>SO THAT I have a greater appreciation for what NASA has accomplished and what it is still working so hard to provide.</a:t>
+            </a:r>
+            <a:endParaRPr lang="en-US" sz="2800" b="1" i="0" u="none" strike="noStrike" dirty="0">
+              <a:solidFill>
+                <a:srgbClr val="595959"/>
+              </a:solidFill>
+              <a:effectLst/>
+              <a:latin typeface="Arial" panose="020B0604020202020204" pitchFamily="34" charset="0"/>
+            </a:endParaRPr>
+          </a:p>
+          <a:p>
+            <a:endParaRPr lang="en-US" dirty="0"/>
           </a:p>
         </p:txBody>
       </p:sp>
     </p:spTree>
     <p:extLst>
       <p:ext uri="{BB962C8B-B14F-4D97-AF65-F5344CB8AC3E}">
-        <p14:creationId xmlns:p14="http://schemas.microsoft.com/office/powerpoint/2010/main" val="2334650148"/>
+        <p14:creationId xmlns:p14="http://schemas.microsoft.com/office/powerpoint/2010/main" val="2230335394"/>
       </p:ext>
     </p:extLst>
   </p:cSld>
@@ -1842,7 +1922,7 @@
           <p:cNvPr id="2" name="Title 1">
             <a:extLst>
               <a:ext uri="{FF2B5EF4-FFF2-40B4-BE49-F238E27FC236}">
-                <a16:creationId xmlns:a16="http://schemas.microsoft.com/office/drawing/2014/main" id="{212C812F-327A-4C13-823A-AA4C76980F67}"/>
+                <a16:creationId xmlns:a16="http://schemas.microsoft.com/office/drawing/2014/main" id="{04479D00-5071-4591-A604-7E4800E70563}"/>
               </a:ext>
             </a:extLst>
           </p:cNvPr>
@@ -1855,18 +1935,25 @@
         </p:nvSpPr>
         <p:spPr>
           <a:xfrm>
-            <a:off x="1524000" y="511927"/>
-            <a:ext cx="9144000" cy="1111537"/>
+            <a:off x="1524000" y="554635"/>
+            <a:ext cx="9144000" cy="820711"/>
           </a:xfrm>
         </p:spPr>
         <p:txBody>
           <a:bodyPr/>
           <a:lstStyle/>
           <a:p>
-            <a:r>
-              <a:rPr lang="en-US" b="1" dirty="0"/>
-              <a:t>CALLING ALL SPACE LOVERS!</a:t>
-            </a:r>
+            <a:pPr algn="l"/>
+            <a:r>
+              <a:rPr lang="en-US" sz="4800" dirty="0">
+                <a:solidFill>
+                  <a:srgbClr val="000000"/>
+                </a:solidFill>
+                <a:latin typeface="Arial" panose="020B0604020202020204" pitchFamily="34" charset="0"/>
+              </a:rPr>
+              <a:t>To create this project:</a:t>
+            </a:r>
+            <a:endParaRPr lang="en-US" sz="4800" dirty="0"/>
           </a:p>
         </p:txBody>
       </p:sp>
@@ -1875,7 +1962,7 @@
           <p:cNvPr id="3" name="Subtitle 2">
             <a:extLst>
               <a:ext uri="{FF2B5EF4-FFF2-40B4-BE49-F238E27FC236}">
-                <a16:creationId xmlns:a16="http://schemas.microsoft.com/office/drawing/2014/main" id="{A0967115-2830-4EE7-9AAD-05DA9871BE3D}"/>
+                <a16:creationId xmlns:a16="http://schemas.microsoft.com/office/drawing/2014/main" id="{60CE013E-6F9D-4A4D-922C-3E36C8158EE0}"/>
               </a:ext>
             </a:extLst>
           </p:cNvPr>
@@ -1888,177 +1975,91 @@
         </p:nvSpPr>
         <p:spPr>
           <a:xfrm>
-            <a:off x="895546" y="1623464"/>
-            <a:ext cx="10435473" cy="4589961"/>
+            <a:off x="1524000" y="1615189"/>
+            <a:ext cx="9144000" cy="4446245"/>
           </a:xfrm>
         </p:spPr>
         <p:txBody>
           <a:bodyPr/>
           <a:lstStyle/>
           <a:p>
-            <a:pPr rtl="0" fontAlgn="base">
-              <a:spcBef>
-                <a:spcPts val="0"/>
-              </a:spcBef>
-              <a:spcAft>
-                <a:spcPts val="0"/>
-              </a:spcAft>
+            <a:pPr marL="342900" indent="-342900" algn="l">
+              <a:buFont typeface="Arial" panose="020B0604020202020204" pitchFamily="34" charset="0"/>
+              <a:buChar char="•"/>
             </a:pPr>
             <a:r>
-              <a:rPr lang="en-US" sz="2800" dirty="0">
-                <a:solidFill>
-                  <a:srgbClr val="595959"/>
-                </a:solidFill>
-                <a:latin typeface="Arial" panose="020B0604020202020204" pitchFamily="34" charset="0"/>
-              </a:rPr>
-              <a:t>Space Explorer was created for YOU!</a:t>
-            </a:r>
-          </a:p>
-          <a:p>
-            <a:pPr rtl="0" fontAlgn="base">
-              <a:spcBef>
-                <a:spcPts val="0"/>
-              </a:spcBef>
-              <a:spcAft>
-                <a:spcPts val="0"/>
-              </a:spcAft>
+              <a:rPr lang="en-US" sz="2000" dirty="0"/>
+              <a:t>HTML, CSS, </a:t>
+            </a:r>
+            <a:r>
+              <a:rPr lang="en-US" sz="2000" dirty="0" err="1"/>
+              <a:t>Bulma</a:t>
+            </a:r>
+            <a:r>
+              <a:rPr lang="en-US" sz="2000" dirty="0"/>
+              <a:t>, and JavaScript were used, as well as the </a:t>
+            </a:r>
+            <a:r>
+              <a:rPr lang="en-US" sz="2000" dirty="0" err="1"/>
+              <a:t>The</a:t>
+            </a:r>
+            <a:r>
+              <a:rPr lang="en-US" sz="2000" dirty="0"/>
+              <a:t> Space Devs API and Nasa’s Astronomy Picture of the Day API.</a:t>
+            </a:r>
+          </a:p>
+          <a:p>
+            <a:pPr marL="342900" indent="-342900" algn="l">
+              <a:buFont typeface="Arial" panose="020B0604020202020204" pitchFamily="34" charset="0"/>
+              <a:buChar char="•"/>
             </a:pPr>
-            <a:endParaRPr lang="en-US" sz="2800" dirty="0">
-              <a:solidFill>
-                <a:srgbClr val="595959"/>
-              </a:solidFill>
-              <a:latin typeface="Arial" panose="020B0604020202020204" pitchFamily="34" charset="0"/>
-            </a:endParaRPr>
-          </a:p>
-          <a:p>
-            <a:pPr rtl="0" fontAlgn="base">
-              <a:spcBef>
-                <a:spcPts val="0"/>
-              </a:spcBef>
-              <a:spcAft>
-                <a:spcPts val="0"/>
-              </a:spcAft>
+            <a:r>
+              <a:rPr lang="en-US" sz="2000" dirty="0"/>
+              <a:t>We met several times to discuss our ideas and find APIs that would work for us. Once we finalized our idea and found the APIs, we started to break down tasks and roles. Jamie created the repository, researched the </a:t>
+            </a:r>
+            <a:r>
+              <a:rPr lang="en-US" sz="2000" dirty="0" err="1"/>
+              <a:t>Bulma</a:t>
+            </a:r>
+            <a:r>
+              <a:rPr lang="en-US" sz="2000" dirty="0"/>
+              <a:t> framework, and started on the HTML and CSS using </a:t>
+            </a:r>
+            <a:r>
+              <a:rPr lang="en-US" sz="2000" dirty="0" err="1"/>
+              <a:t>Bulma</a:t>
+            </a:r>
+            <a:r>
+              <a:rPr lang="en-US" sz="2000" dirty="0"/>
+              <a:t>, Christian found the APIs and fetched them, Brittney, Vanessa, Christian, and Tyler worked on the JavaScript file to make it functional.</a:t>
+            </a:r>
+          </a:p>
+          <a:p>
+            <a:pPr marL="342900" indent="-342900" algn="l">
+              <a:buFont typeface="Arial" panose="020B0604020202020204" pitchFamily="34" charset="0"/>
+              <a:buChar char="•"/>
             </a:pPr>
             <a:r>
-              <a:rPr lang="en-US" sz="2800" dirty="0">
-                <a:solidFill>
-                  <a:srgbClr val="595959"/>
-                </a:solidFill>
-                <a:latin typeface="Arial" panose="020B0604020202020204" pitchFamily="34" charset="0"/>
-              </a:rPr>
-              <a:t>We are so fortunate to live near NASA and are big fans of the space program. We are proud to share this with you!</a:t>
-            </a:r>
-          </a:p>
-          <a:p>
-            <a:pPr rtl="0" fontAlgn="base">
-              <a:spcBef>
-                <a:spcPts val="0"/>
-              </a:spcBef>
-              <a:spcAft>
-                <a:spcPts val="0"/>
-              </a:spcAft>
+              <a:rPr lang="en-US" sz="2000" dirty="0"/>
+              <a:t>We encountered challenges right away. We had 2 other ideas and started on everything but found out the APIs wouldn’t work for us and had to change our idea TWICE!</a:t>
+            </a:r>
+          </a:p>
+          <a:p>
+            <a:pPr marL="342900" indent="-342900" algn="l">
+              <a:buFont typeface="Arial" panose="020B0604020202020204" pitchFamily="34" charset="0"/>
+              <a:buChar char="•"/>
             </a:pPr>
-            <a:endParaRPr lang="en-US" sz="2800" b="0" i="0" u="none" strike="noStrike" dirty="0">
-              <a:solidFill>
-                <a:srgbClr val="595959"/>
-              </a:solidFill>
-              <a:effectLst/>
-              <a:latin typeface="Arial" panose="020B0604020202020204" pitchFamily="34" charset="0"/>
-            </a:endParaRPr>
-          </a:p>
-          <a:p>
-            <a:pPr rtl="0" fontAlgn="base">
-              <a:spcBef>
-                <a:spcPts val="0"/>
-              </a:spcBef>
-              <a:spcAft>
-                <a:spcPts val="1600"/>
-              </a:spcAft>
-            </a:pPr>
-            <a:r>
-              <a:rPr lang="en-US" sz="2800" b="1" dirty="0">
-                <a:solidFill>
-                  <a:srgbClr val="595959"/>
-                </a:solidFill>
-                <a:latin typeface="Arial" panose="020B0604020202020204" pitchFamily="34" charset="0"/>
-              </a:rPr>
-              <a:t>AS A</a:t>
-            </a:r>
-            <a:r>
-              <a:rPr lang="en-US" sz="2800" b="1" i="0" u="none" strike="noStrike" dirty="0">
-                <a:solidFill>
-                  <a:srgbClr val="595959"/>
-                </a:solidFill>
-                <a:effectLst/>
-                <a:latin typeface="Arial" panose="020B0604020202020204" pitchFamily="34" charset="0"/>
-              </a:rPr>
-              <a:t> person who loves space, </a:t>
-            </a:r>
-          </a:p>
-          <a:p>
-            <a:pPr rtl="0" fontAlgn="base">
-              <a:spcBef>
-                <a:spcPts val="0"/>
-              </a:spcBef>
-              <a:spcAft>
-                <a:spcPts val="1600"/>
-              </a:spcAft>
-            </a:pPr>
-            <a:r>
-              <a:rPr lang="en-US" sz="2800" b="1" i="0" u="none" strike="noStrike" dirty="0">
-                <a:solidFill>
-                  <a:srgbClr val="595959"/>
-                </a:solidFill>
-                <a:effectLst/>
-                <a:latin typeface="Arial" panose="020B0604020202020204" pitchFamily="34" charset="0"/>
-              </a:rPr>
-              <a:t>I WANT to learn more about historical launches, my favorite astronaut, and </a:t>
-            </a:r>
-            <a:r>
-              <a:rPr lang="en-US" sz="2800" b="1" dirty="0">
-                <a:solidFill>
-                  <a:srgbClr val="595959"/>
-                </a:solidFill>
-                <a:latin typeface="Arial" panose="020B0604020202020204" pitchFamily="34" charset="0"/>
-              </a:rPr>
-              <a:t>view NASA’s astronomy image of the day, </a:t>
-            </a:r>
-          </a:p>
-          <a:p>
-            <a:pPr rtl="0" fontAlgn="base">
-              <a:spcBef>
-                <a:spcPts val="0"/>
-              </a:spcBef>
-              <a:spcAft>
-                <a:spcPts val="1600"/>
-              </a:spcAft>
-            </a:pPr>
-            <a:r>
-              <a:rPr lang="en-US" sz="2800" b="1" dirty="0">
-                <a:solidFill>
-                  <a:srgbClr val="595959"/>
-                </a:solidFill>
-                <a:latin typeface="Arial" panose="020B0604020202020204" pitchFamily="34" charset="0"/>
-              </a:rPr>
-              <a:t>SO THAT I have a greater appreciation for what NASA has accomplished and what it is still working so hard to provide.</a:t>
-            </a:r>
-            <a:endParaRPr lang="en-US" sz="2800" b="1" i="0" u="none" strike="noStrike" dirty="0">
-              <a:solidFill>
-                <a:srgbClr val="595959"/>
-              </a:solidFill>
-              <a:effectLst/>
-              <a:latin typeface="Arial" panose="020B0604020202020204" pitchFamily="34" charset="0"/>
-            </a:endParaRPr>
-          </a:p>
-          <a:p>
-            <a:endParaRPr lang="en-US" dirty="0"/>
+            <a:r>
+              <a:rPr lang="en-US" sz="2000" dirty="0"/>
+              <a:t>We also had successes throughout. We had good communication skills and reported our progress daily to ensure we met our deadlines and that our project was a success!</a:t>
+            </a:r>
           </a:p>
         </p:txBody>
       </p:sp>
     </p:spTree>
     <p:extLst>
       <p:ext uri="{BB962C8B-B14F-4D97-AF65-F5344CB8AC3E}">
-        <p14:creationId xmlns:p14="http://schemas.microsoft.com/office/powerpoint/2010/main" val="2230335394"/>
+        <p14:creationId xmlns:p14="http://schemas.microsoft.com/office/powerpoint/2010/main" val="2334650148"/>
       </p:ext>
     </p:extLst>
   </p:cSld>
@@ -2439,14 +2440,6 @@
             </a:r>
           </a:p>
           <a:p>
-            <a:pPr rtl="0" fontAlgn="base">
-              <a:spcBef>
-                <a:spcPts val="0"/>
-              </a:spcBef>
-              <a:spcAft>
-                <a:spcPts val="1600"/>
-              </a:spcAft>
-            </a:pPr>
             <a:r>
               <a:rPr lang="en-US" sz="3200" dirty="0">
                 <a:solidFill>
@@ -2454,14 +2447,25 @@
                 </a:solidFill>
                 <a:latin typeface="Arial" panose="020B0604020202020204" pitchFamily="34" charset="0"/>
               </a:rPr>
-              <a:t>Visit our project at https://jamwil1226.github.io/quickvibes/</a:t>
-            </a:r>
-            <a:endParaRPr lang="en-US" sz="3200" b="0" i="0" u="none" strike="noStrike" dirty="0">
+              <a:t>Visit our project at </a:t>
+            </a:r>
+            <a:r>
+              <a:rPr lang="en-US" sz="2400" b="1" dirty="0">
+                <a:solidFill>
+                  <a:srgbClr val="569CD6"/>
+                </a:solidFill>
+                <a:effectLst/>
+                <a:latin typeface="Consolas" panose="020B0609020204030204" pitchFamily="49" charset="0"/>
+                <a:hlinkClick r:id="rId2"/>
+              </a:rPr>
+              <a:t>https://jamwil1226.github.io/space-explorer/</a:t>
+            </a:r>
+            <a:endParaRPr lang="en-US" sz="2400" b="0" dirty="0">
               <a:solidFill>
-                <a:srgbClr val="595959"/>
+                <a:srgbClr val="D4D4D4"/>
               </a:solidFill>
               <a:effectLst/>
-              <a:latin typeface="Arial" panose="020B0604020202020204" pitchFamily="34" charset="0"/>
+              <a:latin typeface="Consolas" panose="020B0609020204030204" pitchFamily="49" charset="0"/>
             </a:endParaRPr>
           </a:p>
           <a:p>
@@ -2474,16 +2478,19 @@
               </a:spcAft>
             </a:pPr>
             <a:r>
-              <a:rPr lang="en-US" sz="3200" b="0" i="0" u="none" strike="noStrike" dirty="0">
+              <a:rPr lang="en-US" b="1" i="0" u="none" strike="noStrike" dirty="0">
                 <a:solidFill>
                   <a:srgbClr val="595959"/>
                 </a:solidFill>
                 <a:effectLst/>
-                <a:latin typeface="Arial" panose="020B0604020202020204" pitchFamily="34" charset="0"/>
+                <a:latin typeface="Consolas" panose="020B0609020204030204" pitchFamily="49" charset="0"/>
+                <a:hlinkClick r:id="rId3"/>
               </a:rPr>
-              <a:t>https://github.com/jamwil1226/quickvibes</a:t>
-            </a:r>
-            <a:endParaRPr lang="en-US" dirty="0"/>
+              <a:t>https://github.com/jamwil1226/space-explorer</a:t>
+            </a:r>
+            <a:endParaRPr lang="en-US" b="1" dirty="0">
+              <a:latin typeface="Consolas" panose="020B0609020204030204" pitchFamily="49" charset="0"/>
+            </a:endParaRPr>
           </a:p>
         </p:txBody>
       </p:sp>
@@ -2491,6 +2498,71 @@
     <p:extLst>
       <p:ext uri="{BB962C8B-B14F-4D97-AF65-F5344CB8AC3E}">
         <p14:creationId xmlns:p14="http://schemas.microsoft.com/office/powerpoint/2010/main" val="371363438"/>
+      </p:ext>
+    </p:extLst>
+  </p:cSld>
+  <p:clrMapOvr>
+    <a:masterClrMapping/>
+  </p:clrMapOvr>
+</p:sld>
+</file>
+
+<file path=ppt/slides/slide8.xml><?xml version="1.0" encoding="utf-8"?>
+<p:sld xmlns:a="http://schemas.openxmlformats.org/drawingml/2006/main" xmlns:r="http://schemas.openxmlformats.org/officeDocument/2006/relationships" xmlns:p="http://schemas.openxmlformats.org/presentationml/2006/main">
+  <p:cSld>
+    <p:spTree>
+      <p:nvGrpSpPr>
+        <p:cNvPr id="1" name=""/>
+        <p:cNvGrpSpPr/>
+        <p:nvPr/>
+      </p:nvGrpSpPr>
+      <p:grpSpPr>
+        <a:xfrm>
+          <a:off x="0" y="0"/>
+          <a:ext cx="0" cy="0"/>
+          <a:chOff x="0" y="0"/>
+          <a:chExt cx="0" cy="0"/>
+        </a:xfrm>
+      </p:grpSpPr>
+      <p:sp>
+        <p:nvSpPr>
+          <p:cNvPr id="2" name="Title 1">
+            <a:extLst>
+              <a:ext uri="{FF2B5EF4-FFF2-40B4-BE49-F238E27FC236}">
+                <a16:creationId xmlns:a16="http://schemas.microsoft.com/office/drawing/2014/main" id="{F13D17ED-2FDD-4D67-9C8A-D1C2CDDA7E17}"/>
+              </a:ext>
+            </a:extLst>
+          </p:cNvPr>
+          <p:cNvSpPr>
+            <a:spLocks noGrp="1"/>
+          </p:cNvSpPr>
+          <p:nvPr>
+            <p:ph type="ctrTitle"/>
+          </p:nvPr>
+        </p:nvSpPr>
+        <p:spPr>
+          <a:xfrm>
+            <a:off x="1524000" y="1669118"/>
+            <a:ext cx="9144000" cy="2387600"/>
+          </a:xfrm>
+        </p:spPr>
+        <p:txBody>
+          <a:bodyPr/>
+          <a:lstStyle/>
+          <a:p>
+            <a:r>
+              <a:rPr lang="en-US" dirty="0">
+                <a:latin typeface="Arial Black" panose="020B0A04020102020204" pitchFamily="34" charset="0"/>
+              </a:rPr>
+              <a:t>ARE THERE ANY QUESTIONS?</a:t>
+            </a:r>
+          </a:p>
+        </p:txBody>
+      </p:sp>
+    </p:spTree>
+    <p:extLst>
+      <p:ext uri="{BB962C8B-B14F-4D97-AF65-F5344CB8AC3E}">
+        <p14:creationId xmlns:p14="http://schemas.microsoft.com/office/powerpoint/2010/main" val="1500790572"/>
       </p:ext>
     </p:extLst>
   </p:cSld>

</xml_diff>

<commit_message>
updated powerpoint to reflect new changes in app
</commit_message>
<xml_diff>
--- a/Space Explorer Group Presentation.pptx
+++ b/Space Explorer Group Presentation.pptx
@@ -10,8 +10,8 @@
   <p:sldIdLst>
     <p:sldId id="256" r:id="rId2"/>
     <p:sldId id="257" r:id="rId3"/>
-    <p:sldId id="259" r:id="rId4"/>
-    <p:sldId id="263" r:id="rId5"/>
+    <p:sldId id="263" r:id="rId4"/>
+    <p:sldId id="259" r:id="rId5"/>
     <p:sldId id="260" r:id="rId6"/>
     <p:sldId id="261" r:id="rId7"/>
     <p:sldId id="262" r:id="rId8"/>
@@ -203,7 +203,7 @@
           <a:p>
             <a:fld id="{093DC16A-B73F-4DBA-888A-012A7EC856C7}" type="datetimeFigureOut">
               <a:rPr lang="en-US" smtClean="0"/>
-              <a:t>10/5/2021</a:t>
+              <a:t>10/7/2021</a:t>
             </a:fld>
             <a:endParaRPr lang="en-US"/>
           </a:p>
@@ -1578,8 +1578,8 @@
         </p:nvSpPr>
         <p:spPr>
           <a:xfrm>
-            <a:off x="1524000" y="2034082"/>
-            <a:ext cx="9144000" cy="3478550"/>
+            <a:off x="1159497" y="1779249"/>
+            <a:ext cx="9926425" cy="4084223"/>
           </a:xfrm>
         </p:spPr>
         <p:txBody>
@@ -1588,7 +1588,7 @@
           <a:p>
             <a:pPr algn="l"/>
             <a:r>
-              <a:rPr lang="en-US" sz="3200" dirty="0"/>
+              <a:rPr lang="en-US" sz="2800" dirty="0"/>
               <a:t>Space Explorer helps you learn more about space, by:</a:t>
             </a:r>
           </a:p>
@@ -1598,8 +1598,8 @@
               <a:buChar char="•"/>
             </a:pPr>
             <a:r>
-              <a:rPr lang="en-US" sz="3200" dirty="0"/>
-              <a:t>giving you information on 10 different historical launches</a:t>
+              <a:rPr lang="en-US" sz="2800" dirty="0"/>
+              <a:t>giving you information on 10 different historical launches, including the Rocket name, the date, the status, and a description,</a:t>
             </a:r>
           </a:p>
           <a:p>
@@ -1608,8 +1608,8 @@
               <a:buChar char="•"/>
             </a:pPr>
             <a:r>
-              <a:rPr lang="en-US" sz="3200" dirty="0"/>
-              <a:t>allowing you to search your favorite astronaut</a:t>
+              <a:rPr lang="en-US" sz="2800" dirty="0"/>
+              <a:t>allowing you to view information on famous astronauts, including their picture, name, nationality, bio, their status, last flight, and a Wikipedia link for more information,</a:t>
             </a:r>
           </a:p>
           <a:p>
@@ -1618,8 +1618,18 @@
               <a:buChar char="•"/>
             </a:pPr>
             <a:r>
-              <a:rPr lang="en-US" sz="3200" dirty="0"/>
-              <a:t>showing you the latest astronomy image of the day from NASA</a:t>
+              <a:rPr lang="en-US" sz="2800" dirty="0"/>
+              <a:t>showing you the latest astronomy image of the day from NASA,</a:t>
+            </a:r>
+          </a:p>
+          <a:p>
+            <a:pPr marL="457200" indent="-457200" algn="l">
+              <a:buFont typeface="Arial" panose="020B0604020202020204" pitchFamily="34" charset="0"/>
+              <a:buChar char="•"/>
+            </a:pPr>
+            <a:r>
+              <a:rPr lang="en-US" sz="2800" dirty="0"/>
+              <a:t>allowing you to save your images of the day.</a:t>
             </a:r>
           </a:p>
           <a:p>
@@ -1673,7 +1683,7 @@
           <p:cNvPr id="2" name="Title 1">
             <a:extLst>
               <a:ext uri="{FF2B5EF4-FFF2-40B4-BE49-F238E27FC236}">
-                <a16:creationId xmlns:a16="http://schemas.microsoft.com/office/drawing/2014/main" id="{04479D00-5071-4591-A604-7E4800E70563}"/>
+                <a16:creationId xmlns:a16="http://schemas.microsoft.com/office/drawing/2014/main" id="{212C812F-327A-4C13-823A-AA4C76980F67}"/>
               </a:ext>
             </a:extLst>
           </p:cNvPr>
@@ -1686,25 +1696,18 @@
         </p:nvSpPr>
         <p:spPr>
           <a:xfrm>
-            <a:off x="1524000" y="554635"/>
-            <a:ext cx="9144000" cy="820711"/>
+            <a:off x="1524000" y="511927"/>
+            <a:ext cx="9144000" cy="1111537"/>
           </a:xfrm>
         </p:spPr>
         <p:txBody>
           <a:bodyPr/>
           <a:lstStyle/>
           <a:p>
-            <a:pPr algn="l"/>
-            <a:r>
-              <a:rPr lang="en-US" sz="4800" dirty="0">
-                <a:solidFill>
-                  <a:srgbClr val="000000"/>
-                </a:solidFill>
-                <a:latin typeface="Arial" panose="020B0604020202020204" pitchFamily="34" charset="0"/>
-              </a:rPr>
-              <a:t>To create this project:</a:t>
-            </a:r>
-            <a:endParaRPr lang="en-US" sz="4800" dirty="0"/>
+            <a:r>
+              <a:rPr lang="en-US" b="1" dirty="0"/>
+              <a:t>CALLING ALL SPACE LOVERS!</a:t>
+            </a:r>
           </a:p>
         </p:txBody>
       </p:sp>
@@ -1713,7 +1716,7 @@
           <p:cNvPr id="3" name="Subtitle 2">
             <a:extLst>
               <a:ext uri="{FF2B5EF4-FFF2-40B4-BE49-F238E27FC236}">
-                <a16:creationId xmlns:a16="http://schemas.microsoft.com/office/drawing/2014/main" id="{60CE013E-6F9D-4A4D-922C-3E36C8158EE0}"/>
+                <a16:creationId xmlns:a16="http://schemas.microsoft.com/office/drawing/2014/main" id="{A0967115-2830-4EE7-9AAD-05DA9871BE3D}"/>
               </a:ext>
             </a:extLst>
           </p:cNvPr>
@@ -1726,91 +1729,196 @@
         </p:nvSpPr>
         <p:spPr>
           <a:xfrm>
-            <a:off x="1524000" y="1615189"/>
-            <a:ext cx="9144000" cy="4446245"/>
+            <a:off x="895546" y="1623464"/>
+            <a:ext cx="10435473" cy="4589961"/>
           </a:xfrm>
         </p:spPr>
         <p:txBody>
           <a:bodyPr/>
           <a:lstStyle/>
           <a:p>
-            <a:pPr marL="342900" indent="-342900" algn="l">
-              <a:buFont typeface="Arial" panose="020B0604020202020204" pitchFamily="34" charset="0"/>
-              <a:buChar char="•"/>
+            <a:pPr rtl="0" fontAlgn="base">
+              <a:spcBef>
+                <a:spcPts val="0"/>
+              </a:spcBef>
+              <a:spcAft>
+                <a:spcPts val="0"/>
+              </a:spcAft>
             </a:pPr>
             <a:r>
-              <a:rPr lang="en-US" sz="2000" dirty="0"/>
-              <a:t>HTML, CSS, </a:t>
-            </a:r>
-            <a:r>
-              <a:rPr lang="en-US" sz="2000" dirty="0" err="1"/>
-              <a:t>Bulma</a:t>
-            </a:r>
-            <a:r>
-              <a:rPr lang="en-US" sz="2000" dirty="0"/>
-              <a:t>, and JavaScript were used, as well as the </a:t>
-            </a:r>
-            <a:r>
-              <a:rPr lang="en-US" sz="2000" dirty="0" err="1"/>
-              <a:t>The</a:t>
-            </a:r>
-            <a:r>
-              <a:rPr lang="en-US" sz="2000" dirty="0"/>
-              <a:t> Space Devs API and Nasa’s Astronomy Picture of the Day API.</a:t>
-            </a:r>
-          </a:p>
-          <a:p>
-            <a:pPr marL="342900" indent="-342900" algn="l">
-              <a:buFont typeface="Arial" panose="020B0604020202020204" pitchFamily="34" charset="0"/>
-              <a:buChar char="•"/>
+              <a:rPr lang="en-US" sz="2800" dirty="0">
+                <a:solidFill>
+                  <a:srgbClr val="595959"/>
+                </a:solidFill>
+                <a:latin typeface="Arial" panose="020B0604020202020204" pitchFamily="34" charset="0"/>
+              </a:rPr>
+              <a:t>Space Explorer was created for YOU!</a:t>
+            </a:r>
+          </a:p>
+          <a:p>
+            <a:pPr rtl="0" fontAlgn="base">
+              <a:spcBef>
+                <a:spcPts val="0"/>
+              </a:spcBef>
+              <a:spcAft>
+                <a:spcPts val="0"/>
+              </a:spcAft>
             </a:pPr>
-            <a:r>
-              <a:rPr lang="en-US" sz="2000" dirty="0"/>
-              <a:t>We met several times to discuss our ideas and find APIs that would work for us. Once we finalized our idea and found the APIs, we started to break down tasks and roles. Jamie created the repository, researched the </a:t>
-            </a:r>
-            <a:r>
-              <a:rPr lang="en-US" sz="2000" dirty="0" err="1"/>
-              <a:t>Bulma</a:t>
-            </a:r>
-            <a:r>
-              <a:rPr lang="en-US" sz="2000" dirty="0"/>
-              <a:t> framework, and started on the HTML and CSS using </a:t>
-            </a:r>
-            <a:r>
-              <a:rPr lang="en-US" sz="2000" dirty="0" err="1"/>
-              <a:t>Bulma</a:t>
-            </a:r>
-            <a:r>
-              <a:rPr lang="en-US" sz="2000" dirty="0"/>
-              <a:t>, Christian found the APIs and fetched them, Brittney, Vanessa, and Christian worked on the JavaScript file to make it functional, and Tyler ___________.</a:t>
-            </a:r>
-          </a:p>
-          <a:p>
-            <a:pPr marL="342900" indent="-342900" algn="l">
-              <a:buFont typeface="Arial" panose="020B0604020202020204" pitchFamily="34" charset="0"/>
-              <a:buChar char="•"/>
+            <a:endParaRPr lang="en-US" sz="2800" dirty="0">
+              <a:solidFill>
+                <a:srgbClr val="595959"/>
+              </a:solidFill>
+              <a:latin typeface="Arial" panose="020B0604020202020204" pitchFamily="34" charset="0"/>
+            </a:endParaRPr>
+          </a:p>
+          <a:p>
+            <a:pPr rtl="0" fontAlgn="base">
+              <a:spcBef>
+                <a:spcPts val="0"/>
+              </a:spcBef>
+              <a:spcAft>
+                <a:spcPts val="0"/>
+              </a:spcAft>
             </a:pPr>
             <a:r>
-              <a:rPr lang="en-US" sz="2000" dirty="0"/>
-              <a:t>We encountered challenges right away. We had 2 other ideas and started on everything but found out the APIs wouldn’t work for us and had to change our idea TWICE!</a:t>
-            </a:r>
-          </a:p>
-          <a:p>
-            <a:pPr marL="342900" indent="-342900" algn="l">
-              <a:buFont typeface="Arial" panose="020B0604020202020204" pitchFamily="34" charset="0"/>
-              <a:buChar char="•"/>
+              <a:rPr lang="en-US" sz="2800" dirty="0">
+                <a:solidFill>
+                  <a:srgbClr val="595959"/>
+                </a:solidFill>
+                <a:latin typeface="Arial" panose="020B0604020202020204" pitchFamily="34" charset="0"/>
+              </a:rPr>
+              <a:t>We are so fortunate to live near NASA and are big fans of the space program. We are proud to share this with you!</a:t>
+            </a:r>
+          </a:p>
+          <a:p>
+            <a:pPr rtl="0" fontAlgn="base">
+              <a:spcBef>
+                <a:spcPts val="0"/>
+              </a:spcBef>
+              <a:spcAft>
+                <a:spcPts val="0"/>
+              </a:spcAft>
             </a:pPr>
-            <a:r>
-              <a:rPr lang="en-US" sz="2000" dirty="0"/>
-              <a:t>We also had successes throughout. We had good communication skills and reported our progress daily to ensure we met our deadlines and that our project was a success!</a:t>
-            </a:r>
+            <a:endParaRPr lang="en-US" sz="2800" b="0" i="0" u="none" strike="noStrike" dirty="0">
+              <a:solidFill>
+                <a:srgbClr val="595959"/>
+              </a:solidFill>
+              <a:effectLst/>
+              <a:latin typeface="Arial" panose="020B0604020202020204" pitchFamily="34" charset="0"/>
+            </a:endParaRPr>
+          </a:p>
+          <a:p>
+            <a:pPr rtl="0" fontAlgn="base">
+              <a:spcBef>
+                <a:spcPts val="0"/>
+              </a:spcBef>
+              <a:spcAft>
+                <a:spcPts val="1600"/>
+              </a:spcAft>
+            </a:pPr>
+            <a:r>
+              <a:rPr lang="en-US" sz="2800" b="1" dirty="0">
+                <a:solidFill>
+                  <a:srgbClr val="595959"/>
+                </a:solidFill>
+                <a:latin typeface="Arial" panose="020B0604020202020204" pitchFamily="34" charset="0"/>
+              </a:rPr>
+              <a:t>AS A</a:t>
+            </a:r>
+            <a:r>
+              <a:rPr lang="en-US" sz="2800" b="1" i="0" u="none" strike="noStrike" dirty="0">
+                <a:solidFill>
+                  <a:srgbClr val="595959"/>
+                </a:solidFill>
+                <a:effectLst/>
+                <a:latin typeface="Arial" panose="020B0604020202020204" pitchFamily="34" charset="0"/>
+              </a:rPr>
+              <a:t> person who loves space, </a:t>
+            </a:r>
+          </a:p>
+          <a:p>
+            <a:pPr rtl="0" fontAlgn="base">
+              <a:spcBef>
+                <a:spcPts val="0"/>
+              </a:spcBef>
+              <a:spcAft>
+                <a:spcPts val="1600"/>
+              </a:spcAft>
+            </a:pPr>
+            <a:r>
+              <a:rPr lang="en-US" sz="2800" b="1" i="0" u="none" strike="noStrike" dirty="0">
+                <a:solidFill>
+                  <a:srgbClr val="595959"/>
+                </a:solidFill>
+                <a:effectLst/>
+                <a:latin typeface="Arial" panose="020B0604020202020204" pitchFamily="34" charset="0"/>
+              </a:rPr>
+              <a:t>I WANT to learn more about historical launches, </a:t>
+            </a:r>
+            <a:r>
+              <a:rPr lang="en-US" sz="2800" b="1" dirty="0">
+                <a:solidFill>
+                  <a:srgbClr val="595959"/>
+                </a:solidFill>
+                <a:latin typeface="Arial" panose="020B0604020202020204" pitchFamily="34" charset="0"/>
+              </a:rPr>
+              <a:t>famous</a:t>
+            </a:r>
+            <a:r>
+              <a:rPr lang="en-US" sz="2800" b="1" i="0" u="none" strike="noStrike" dirty="0">
+                <a:solidFill>
+                  <a:srgbClr val="595959"/>
+                </a:solidFill>
+                <a:effectLst/>
+                <a:latin typeface="Arial" panose="020B0604020202020204" pitchFamily="34" charset="0"/>
+              </a:rPr>
+              <a:t> astronauts, and </a:t>
+            </a:r>
+            <a:r>
+              <a:rPr lang="en-US" sz="2800" b="1" dirty="0">
+                <a:solidFill>
+                  <a:srgbClr val="595959"/>
+                </a:solidFill>
+                <a:latin typeface="Arial" panose="020B0604020202020204" pitchFamily="34" charset="0"/>
+              </a:rPr>
+              <a:t>view NASA’s astronomy image of the day, </a:t>
+            </a:r>
+          </a:p>
+          <a:p>
+            <a:pPr rtl="0" fontAlgn="base">
+              <a:spcBef>
+                <a:spcPts val="0"/>
+              </a:spcBef>
+              <a:spcAft>
+                <a:spcPts val="1600"/>
+              </a:spcAft>
+            </a:pPr>
+            <a:r>
+              <a:rPr lang="en-US" sz="2800" b="1" dirty="0">
+                <a:solidFill>
+                  <a:srgbClr val="595959"/>
+                </a:solidFill>
+                <a:latin typeface="Arial" panose="020B0604020202020204" pitchFamily="34" charset="0"/>
+              </a:rPr>
+              <a:t>SO THAT I have a greater appreciation for what NASA has accomplished and what it is still working so hard to provide.</a:t>
+            </a:r>
+            <a:endParaRPr lang="en-US" sz="2800" b="1" i="0" u="none" strike="noStrike" dirty="0">
+              <a:solidFill>
+                <a:srgbClr val="595959"/>
+              </a:solidFill>
+              <a:effectLst/>
+              <a:latin typeface="Arial" panose="020B0604020202020204" pitchFamily="34" charset="0"/>
+            </a:endParaRPr>
+          </a:p>
+          <a:p>
+            <a:endParaRPr lang="en-US" dirty="0"/>
           </a:p>
         </p:txBody>
       </p:sp>
     </p:spTree>
     <p:extLst>
       <p:ext uri="{BB962C8B-B14F-4D97-AF65-F5344CB8AC3E}">
-        <p14:creationId xmlns:p14="http://schemas.microsoft.com/office/powerpoint/2010/main" val="2334650148"/>
+        <p14:creationId xmlns:p14="http://schemas.microsoft.com/office/powerpoint/2010/main" val="2230335394"/>
       </p:ext>
     </p:extLst>
   </p:cSld>
@@ -1842,7 +1950,7 @@
           <p:cNvPr id="2" name="Title 1">
             <a:extLst>
               <a:ext uri="{FF2B5EF4-FFF2-40B4-BE49-F238E27FC236}">
-                <a16:creationId xmlns:a16="http://schemas.microsoft.com/office/drawing/2014/main" id="{212C812F-327A-4C13-823A-AA4C76980F67}"/>
+                <a16:creationId xmlns:a16="http://schemas.microsoft.com/office/drawing/2014/main" id="{04479D00-5071-4591-A604-7E4800E70563}"/>
               </a:ext>
             </a:extLst>
           </p:cNvPr>
@@ -1855,18 +1963,25 @@
         </p:nvSpPr>
         <p:spPr>
           <a:xfrm>
-            <a:off x="1524000" y="511927"/>
-            <a:ext cx="9144000" cy="1111537"/>
+            <a:off x="1524000" y="554635"/>
+            <a:ext cx="9144000" cy="820711"/>
           </a:xfrm>
         </p:spPr>
         <p:txBody>
           <a:bodyPr/>
           <a:lstStyle/>
           <a:p>
-            <a:r>
-              <a:rPr lang="en-US" b="1" dirty="0"/>
-              <a:t>CALLING ALL SPACE LOVERS!</a:t>
-            </a:r>
+            <a:pPr algn="l"/>
+            <a:r>
+              <a:rPr lang="en-US" sz="4800" dirty="0">
+                <a:solidFill>
+                  <a:srgbClr val="000000"/>
+                </a:solidFill>
+                <a:latin typeface="Arial" panose="020B0604020202020204" pitchFamily="34" charset="0"/>
+              </a:rPr>
+              <a:t>To create this project:</a:t>
+            </a:r>
+            <a:endParaRPr lang="en-US" sz="4800" dirty="0"/>
           </a:p>
         </p:txBody>
       </p:sp>
@@ -1875,7 +1990,7 @@
           <p:cNvPr id="3" name="Subtitle 2">
             <a:extLst>
               <a:ext uri="{FF2B5EF4-FFF2-40B4-BE49-F238E27FC236}">
-                <a16:creationId xmlns:a16="http://schemas.microsoft.com/office/drawing/2014/main" id="{A0967115-2830-4EE7-9AAD-05DA9871BE3D}"/>
+                <a16:creationId xmlns:a16="http://schemas.microsoft.com/office/drawing/2014/main" id="{60CE013E-6F9D-4A4D-922C-3E36C8158EE0}"/>
               </a:ext>
             </a:extLst>
           </p:cNvPr>
@@ -1888,177 +2003,99 @@
         </p:nvSpPr>
         <p:spPr>
           <a:xfrm>
-            <a:off x="895546" y="1623464"/>
-            <a:ext cx="10435473" cy="4589961"/>
+            <a:off x="1524000" y="1615189"/>
+            <a:ext cx="9144000" cy="4446245"/>
           </a:xfrm>
         </p:spPr>
         <p:txBody>
           <a:bodyPr/>
           <a:lstStyle/>
           <a:p>
-            <a:pPr rtl="0" fontAlgn="base">
-              <a:spcBef>
-                <a:spcPts val="0"/>
-              </a:spcBef>
-              <a:spcAft>
-                <a:spcPts val="0"/>
-              </a:spcAft>
+            <a:pPr marL="342900" indent="-342900" algn="l">
+              <a:buFont typeface="Arial" panose="020B0604020202020204" pitchFamily="34" charset="0"/>
+              <a:buChar char="•"/>
             </a:pPr>
             <a:r>
-              <a:rPr lang="en-US" sz="2800" dirty="0">
-                <a:solidFill>
-                  <a:srgbClr val="595959"/>
-                </a:solidFill>
-                <a:latin typeface="Arial" panose="020B0604020202020204" pitchFamily="34" charset="0"/>
-              </a:rPr>
-              <a:t>Space Explorer was created for YOU!</a:t>
-            </a:r>
-          </a:p>
-          <a:p>
-            <a:pPr rtl="0" fontAlgn="base">
-              <a:spcBef>
-                <a:spcPts val="0"/>
-              </a:spcBef>
-              <a:spcAft>
-                <a:spcPts val="0"/>
-              </a:spcAft>
+              <a:rPr lang="en-US" sz="2000" dirty="0"/>
+              <a:t>HTML, CSS, </a:t>
+            </a:r>
+            <a:r>
+              <a:rPr lang="en-US" sz="2000" dirty="0" err="1"/>
+              <a:t>Bulma</a:t>
+            </a:r>
+            <a:r>
+              <a:rPr lang="en-US" sz="2000" dirty="0"/>
+              <a:t>, JavaScript &amp; </a:t>
+            </a:r>
+            <a:r>
+              <a:rPr lang="en-US" sz="2000" dirty="0" err="1"/>
+              <a:t>Jquery</a:t>
+            </a:r>
+            <a:r>
+              <a:rPr lang="en-US" sz="2000" dirty="0"/>
+              <a:t> were used, as well as the </a:t>
+            </a:r>
+            <a:r>
+              <a:rPr lang="en-US" sz="2000" dirty="0" err="1"/>
+              <a:t>The</a:t>
+            </a:r>
+            <a:r>
+              <a:rPr lang="en-US" sz="2000" dirty="0"/>
+              <a:t> Space Devs API and Nasa’s Astronomy Picture of the Day API.</a:t>
+            </a:r>
+          </a:p>
+          <a:p>
+            <a:pPr marL="342900" indent="-342900" algn="l">
+              <a:buFont typeface="Arial" panose="020B0604020202020204" pitchFamily="34" charset="0"/>
+              <a:buChar char="•"/>
             </a:pPr>
-            <a:endParaRPr lang="en-US" sz="2800" dirty="0">
-              <a:solidFill>
-                <a:srgbClr val="595959"/>
-              </a:solidFill>
-              <a:latin typeface="Arial" panose="020B0604020202020204" pitchFamily="34" charset="0"/>
-            </a:endParaRPr>
-          </a:p>
-          <a:p>
-            <a:pPr rtl="0" fontAlgn="base">
-              <a:spcBef>
-                <a:spcPts val="0"/>
-              </a:spcBef>
-              <a:spcAft>
-                <a:spcPts val="0"/>
-              </a:spcAft>
+            <a:r>
+              <a:rPr lang="en-US" sz="2000" dirty="0"/>
+              <a:t>We met several times to discuss our ideas and find APIs that would work for us. Once we finalized our idea and found the APIs, we started to break down tasks and roles. Jamie created the repository, researched the </a:t>
+            </a:r>
+            <a:r>
+              <a:rPr lang="en-US" sz="2000" dirty="0" err="1"/>
+              <a:t>Bulma</a:t>
+            </a:r>
+            <a:r>
+              <a:rPr lang="en-US" sz="2000" dirty="0"/>
+              <a:t> framework, and started on the HTML and CSS using </a:t>
+            </a:r>
+            <a:r>
+              <a:rPr lang="en-US" sz="2000" dirty="0" err="1"/>
+              <a:t>Bulma</a:t>
+            </a:r>
+            <a:r>
+              <a:rPr lang="en-US" sz="2000" dirty="0"/>
+              <a:t>, Christian found the APIs and fetched them, Brittney, Vanessa, Christian, and Tyler worked on the JavaScript file to make it functional.</a:t>
+            </a:r>
+          </a:p>
+          <a:p>
+            <a:pPr marL="342900" indent="-342900" algn="l">
+              <a:buFont typeface="Arial" panose="020B0604020202020204" pitchFamily="34" charset="0"/>
+              <a:buChar char="•"/>
             </a:pPr>
             <a:r>
-              <a:rPr lang="en-US" sz="2800" dirty="0">
-                <a:solidFill>
-                  <a:srgbClr val="595959"/>
-                </a:solidFill>
-                <a:latin typeface="Arial" panose="020B0604020202020204" pitchFamily="34" charset="0"/>
-              </a:rPr>
-              <a:t>We are so fortunate to live near NASA and are big fans of the space program. We are proud to share this with you!</a:t>
-            </a:r>
-          </a:p>
-          <a:p>
-            <a:pPr rtl="0" fontAlgn="base">
-              <a:spcBef>
-                <a:spcPts val="0"/>
-              </a:spcBef>
-              <a:spcAft>
-                <a:spcPts val="0"/>
-              </a:spcAft>
+              <a:rPr lang="en-US" sz="2000" dirty="0"/>
+              <a:t>We encountered challenges right away. We had 2 other ideas and started on everything but found out the APIs wouldn’t work for us and had to change our idea TWICE!</a:t>
+            </a:r>
+          </a:p>
+          <a:p>
+            <a:pPr marL="342900" indent="-342900" algn="l">
+              <a:buFont typeface="Arial" panose="020B0604020202020204" pitchFamily="34" charset="0"/>
+              <a:buChar char="•"/>
             </a:pPr>
-            <a:endParaRPr lang="en-US" sz="2800" b="0" i="0" u="none" strike="noStrike" dirty="0">
-              <a:solidFill>
-                <a:srgbClr val="595959"/>
-              </a:solidFill>
-              <a:effectLst/>
-              <a:latin typeface="Arial" panose="020B0604020202020204" pitchFamily="34" charset="0"/>
-            </a:endParaRPr>
-          </a:p>
-          <a:p>
-            <a:pPr rtl="0" fontAlgn="base">
-              <a:spcBef>
-                <a:spcPts val="0"/>
-              </a:spcBef>
-              <a:spcAft>
-                <a:spcPts val="1600"/>
-              </a:spcAft>
-            </a:pPr>
-            <a:r>
-              <a:rPr lang="en-US" sz="2800" b="1" dirty="0">
-                <a:solidFill>
-                  <a:srgbClr val="595959"/>
-                </a:solidFill>
-                <a:latin typeface="Arial" panose="020B0604020202020204" pitchFamily="34" charset="0"/>
-              </a:rPr>
-              <a:t>AS A</a:t>
-            </a:r>
-            <a:r>
-              <a:rPr lang="en-US" sz="2800" b="1" i="0" u="none" strike="noStrike" dirty="0">
-                <a:solidFill>
-                  <a:srgbClr val="595959"/>
-                </a:solidFill>
-                <a:effectLst/>
-                <a:latin typeface="Arial" panose="020B0604020202020204" pitchFamily="34" charset="0"/>
-              </a:rPr>
-              <a:t> person who loves space, </a:t>
-            </a:r>
-          </a:p>
-          <a:p>
-            <a:pPr rtl="0" fontAlgn="base">
-              <a:spcBef>
-                <a:spcPts val="0"/>
-              </a:spcBef>
-              <a:spcAft>
-                <a:spcPts val="1600"/>
-              </a:spcAft>
-            </a:pPr>
-            <a:r>
-              <a:rPr lang="en-US" sz="2800" b="1" i="0" u="none" strike="noStrike" dirty="0">
-                <a:solidFill>
-                  <a:srgbClr val="595959"/>
-                </a:solidFill>
-                <a:effectLst/>
-                <a:latin typeface="Arial" panose="020B0604020202020204" pitchFamily="34" charset="0"/>
-              </a:rPr>
-              <a:t>I WANT to learn more about historical launches, my favorite astronaut, and </a:t>
-            </a:r>
-            <a:r>
-              <a:rPr lang="en-US" sz="2800" b="1" dirty="0">
-                <a:solidFill>
-                  <a:srgbClr val="595959"/>
-                </a:solidFill>
-                <a:latin typeface="Arial" panose="020B0604020202020204" pitchFamily="34" charset="0"/>
-              </a:rPr>
-              <a:t>view NASA’s astronomy image of the day, </a:t>
-            </a:r>
-          </a:p>
-          <a:p>
-            <a:pPr rtl="0" fontAlgn="base">
-              <a:spcBef>
-                <a:spcPts val="0"/>
-              </a:spcBef>
-              <a:spcAft>
-                <a:spcPts val="1600"/>
-              </a:spcAft>
-            </a:pPr>
-            <a:r>
-              <a:rPr lang="en-US" sz="2800" b="1" dirty="0">
-                <a:solidFill>
-                  <a:srgbClr val="595959"/>
-                </a:solidFill>
-                <a:latin typeface="Arial" panose="020B0604020202020204" pitchFamily="34" charset="0"/>
-              </a:rPr>
-              <a:t>SO THAT I have a greater appreciation for what NASA has accomplished and what it is still working so hard to provide.</a:t>
-            </a:r>
-            <a:endParaRPr lang="en-US" sz="2800" b="1" i="0" u="none" strike="noStrike" dirty="0">
-              <a:solidFill>
-                <a:srgbClr val="595959"/>
-              </a:solidFill>
-              <a:effectLst/>
-              <a:latin typeface="Arial" panose="020B0604020202020204" pitchFamily="34" charset="0"/>
-            </a:endParaRPr>
-          </a:p>
-          <a:p>
-            <a:endParaRPr lang="en-US" dirty="0"/>
+            <a:r>
+              <a:rPr lang="en-US" sz="2000" dirty="0"/>
+              <a:t>We also had successes throughout. We had good communication skills and reported our progress daily to ensure we met our deadlines and that our project was a success!</a:t>
+            </a:r>
           </a:p>
         </p:txBody>
       </p:sp>
     </p:spTree>
     <p:extLst>
       <p:ext uri="{BB962C8B-B14F-4D97-AF65-F5344CB8AC3E}">
-        <p14:creationId xmlns:p14="http://schemas.microsoft.com/office/powerpoint/2010/main" val="2230335394"/>
+        <p14:creationId xmlns:p14="http://schemas.microsoft.com/office/powerpoint/2010/main" val="2334650148"/>
       </p:ext>
     </p:extLst>
   </p:cSld>
@@ -2127,10 +2164,10 @@
       </p:sp>
       <p:pic>
         <p:nvPicPr>
-          <p:cNvPr id="5" name="Picture 4" descr="A rocket taking off&#10;&#10;Description automatically generated with low confidence">
+          <p:cNvPr id="4" name="Picture 3" descr="A picture containing text, weapon, rocket&#10;&#10;Description automatically generated">
             <a:extLst>
               <a:ext uri="{FF2B5EF4-FFF2-40B4-BE49-F238E27FC236}">
-                <a16:creationId xmlns:a16="http://schemas.microsoft.com/office/drawing/2014/main" id="{EA039302-EE6A-4DBA-A394-2AF5E07F84B8}"/>
+                <a16:creationId xmlns:a16="http://schemas.microsoft.com/office/drawing/2014/main" id="{5C7505EA-43A1-444D-9651-5C3CEA15C381}"/>
               </a:ext>
             </a:extLst>
           </p:cNvPr>
@@ -2153,8 +2190,8 @@
         </p:blipFill>
         <p:spPr>
           <a:xfrm>
-            <a:off x="1711377" y="1726133"/>
-            <a:ext cx="8769246" cy="4333747"/>
+            <a:off x="1385740" y="1726133"/>
+            <a:ext cx="9420520" cy="4640699"/>
           </a:xfrm>
           <a:prstGeom prst="rect">
             <a:avLst/>
@@ -2269,7 +2306,7 @@
             </a:pPr>
             <a:r>
               <a:rPr lang="en-US" sz="3600" dirty="0"/>
-              <a:t>Add information about past expeditions</a:t>
+              <a:t>Add more recent launches </a:t>
             </a:r>
           </a:p>
           <a:p>
@@ -2454,7 +2491,17 @@
                 </a:solidFill>
                 <a:latin typeface="Arial" panose="020B0604020202020204" pitchFamily="34" charset="0"/>
               </a:rPr>
-              <a:t>Visit our project at https://jamwil1226.github.io/quickvibes/</a:t>
+              <a:t>Visit our project at </a:t>
+            </a:r>
+            <a:r>
+              <a:rPr lang="en-US" sz="3200" dirty="0">
+                <a:solidFill>
+                  <a:srgbClr val="595959"/>
+                </a:solidFill>
+                <a:latin typeface="Arial" panose="020B0604020202020204" pitchFamily="34" charset="0"/>
+                <a:hlinkClick r:id="rId2"/>
+              </a:rPr>
+              <a:t>https://jamwil1226.github.io/space-explorer/</a:t>
             </a:r>
             <a:endParaRPr lang="en-US" sz="3200" b="0" i="0" u="none" strike="noStrike" dirty="0">
               <a:solidFill>
@@ -2480,8 +2527,9 @@
                 </a:solidFill>
                 <a:effectLst/>
                 <a:latin typeface="Arial" panose="020B0604020202020204" pitchFamily="34" charset="0"/>
+                <a:hlinkClick r:id="rId3"/>
               </a:rPr>
-              <a:t>https://github.com/jamwil1226/quickvibes</a:t>
+              <a:t>https://github.com/jamwil1226/space-explorer</a:t>
             </a:r>
             <a:endParaRPr lang="en-US" dirty="0"/>
           </a:p>

</xml_diff>